<commit_message>
update the ppt for weekly meeting
</commit_message>
<xml_diff>
--- a/doc/09.20.2013 ITSPOKE Meeting/NLU in Bosch.pptx
+++ b/doc/09.20.2013 ITSPOKE Meeting/NLU in Bosch.pptx
@@ -2578,11 +2578,11 @@
         </c:dLbls>
         <c:marker val="1"/>
         <c:smooth val="0"/>
-        <c:axId val="134303104"/>
-        <c:axId val="156833664"/>
+        <c:axId val="44586880"/>
+        <c:axId val="44588416"/>
       </c:lineChart>
       <c:catAx>
-        <c:axId val="134303104"/>
+        <c:axId val="44586880"/>
         <c:scaling>
           <c:orientation val="minMax"/>
         </c:scaling>
@@ -2591,7 +2591,7 @@
         <c:majorTickMark val="out"/>
         <c:minorTickMark val="none"/>
         <c:tickLblPos val="nextTo"/>
-        <c:crossAx val="156833664"/>
+        <c:crossAx val="44588416"/>
         <c:crosses val="autoZero"/>
         <c:auto val="1"/>
         <c:lblAlgn val="ctr"/>
@@ -2599,7 +2599,7 @@
         <c:noMultiLvlLbl val="0"/>
       </c:catAx>
       <c:valAx>
-        <c:axId val="156833664"/>
+        <c:axId val="44588416"/>
         <c:scaling>
           <c:orientation val="minMax"/>
         </c:scaling>
@@ -2610,7 +2610,7 @@
         <c:majorTickMark val="out"/>
         <c:minorTickMark val="none"/>
         <c:tickLblPos val="nextTo"/>
-        <c:crossAx val="134303104"/>
+        <c:crossAx val="44586880"/>
         <c:crosses val="autoZero"/>
         <c:crossBetween val="between"/>
       </c:valAx>
@@ -2708,7 +2708,7 @@
             <a:fld id="{5B5349A0-9DCA-4449-8462-5D9CB563EABC}" type="datetimeFigureOut">
               <a:rPr lang="zh-CN" altLang="en-US" smtClean="0"/>
               <a:pPr/>
-              <a:t>2013-9-20</a:t>
+              <a:t>2013/9/20</a:t>
             </a:fld>
             <a:endParaRPr lang="zh-CN" altLang="en-US"/>
           </a:p>
@@ -6736,15 +6736,7 @@
           <a:p>
             <a:r>
               <a:rPr lang="en-US" sz="2800" dirty="0" smtClean="0"/>
-              <a:t>Natural Language Understanding (NLU) </a:t>
-            </a:r>
-            <a:r>
-              <a:rPr lang="en-US" sz="2800" dirty="0" smtClean="0"/>
-              <a:t>for</a:t>
-            </a:r>
-            <a:r>
-              <a:rPr lang="en-US" sz="2800" dirty="0" smtClean="0"/>
-              <a:t> Automobiles</a:t>
+              <a:t>Natural Language Understanding (NLU) for Automobiles</a:t>
             </a:r>
             <a:endParaRPr lang="en-US" sz="2800" dirty="0"/>
           </a:p>
@@ -7196,8 +7188,13 @@
           <a:p>
             <a:r>
               <a:rPr lang="en-US" dirty="0" smtClean="0"/>
-              <a:t>Spoken Data</a:t>
-            </a:r>
+              <a:t>Spoken </a:t>
+            </a:r>
+            <a:r>
+              <a:rPr lang="en-US" dirty="0" smtClean="0"/>
+              <a:t>data</a:t>
+            </a:r>
+            <a:endParaRPr lang="en-US" dirty="0" smtClean="0"/>
           </a:p>
           <a:p>
             <a:pPr lvl="1"/>
@@ -7507,7 +7504,6 @@
               <a:rPr lang="en-US" dirty="0" smtClean="0"/>
               <a:t>ASR errors</a:t>
             </a:r>
-            <a:endParaRPr lang="en-US" dirty="0" smtClean="0"/>
           </a:p>
         </p:txBody>
       </p:sp>
@@ -7637,7 +7633,6 @@
               <a:rPr lang="en-US" dirty="0" smtClean="0"/>
               <a:t>Baseline</a:t>
             </a:r>
-            <a:endParaRPr lang="en-US" dirty="0" smtClean="0"/>
           </a:p>
           <a:p>
             <a:r>
@@ -7648,11 +7643,7 @@
           <a:p>
             <a:r>
               <a:rPr lang="en-US" dirty="0" smtClean="0"/>
-              <a:t>Class-Based </a:t>
-            </a:r>
-            <a:r>
-              <a:rPr lang="en-US" dirty="0" smtClean="0"/>
-              <a:t>Model</a:t>
+              <a:t>Class-Based Model</a:t>
             </a:r>
           </a:p>
           <a:p>
@@ -9896,7 +9887,11 @@
           <a:p>
             <a:r>
               <a:rPr lang="en-US" dirty="0" smtClean="0"/>
-              <a:t>Majority voting is bad</a:t>
+              <a:t>Majority </a:t>
+            </a:r>
+            <a:r>
+              <a:rPr lang="en-US" dirty="0" smtClean="0"/>
+              <a:t>voting is bad</a:t>
             </a:r>
           </a:p>
           <a:p>
@@ -10342,18 +10337,14 @@
           <a:p>
             <a:r>
               <a:rPr lang="en-US" dirty="0" smtClean="0"/>
-              <a:t>Future </a:t>
-            </a:r>
-            <a:r>
-              <a:rPr lang="en-US" dirty="0" smtClean="0"/>
-              <a:t>Work</a:t>
+              <a:t>Future Work</a:t>
             </a:r>
             <a:endParaRPr lang="en-US" dirty="0"/>
           </a:p>
         </p:txBody>
       </p:sp>
-      <mc:AlternateContent xmlns:mc="http://schemas.openxmlformats.org/markup-compatibility/2006">
-        <mc:Choice xmlns:a14="http://schemas.microsoft.com/office/drawing/2010/main" Requires="a14">
+      <mc:AlternateContent xmlns:mc="http://schemas.openxmlformats.org/markup-compatibility/2006" xmlns:a14="http://schemas.microsoft.com/office/drawing/2010/main">
+        <mc:Choice Requires="a14">
           <p:sp>
             <p:nvSpPr>
               <p:cNvPr id="3" name="Content Placeholder 2"/>
@@ -10555,7 +10546,7 @@
             </p:txBody>
           </p:sp>
         </mc:Choice>
-        <mc:Fallback>
+        <mc:Fallback xmlns="">
           <p:sp>
             <p:nvSpPr>
               <p:cNvPr id="3" name="Content Placeholder 2"/>
@@ -10767,7 +10758,6 @@
               <a:rPr lang="en-US" dirty="0" smtClean="0"/>
               <a:t>POS, CHK, NER, SRL</a:t>
             </a:r>
-            <a:endParaRPr lang="en-US" dirty="0" smtClean="0"/>
           </a:p>
           <a:p>
             <a:pPr marL="469900" lvl="1" indent="-469900">
@@ -11041,13 +11031,7 @@
               <a:rPr lang="en-US" sz="1500" dirty="0" smtClean="0">
                 <a:hlinkClick r:id="rId2"/>
               </a:rPr>
-              <a:t>NJ</a:t>
-            </a:r>
-            <a:r>
-              <a:rPr lang="en-US" sz="1500" dirty="0" smtClean="0">
-                <a:hlinkClick r:id="rId2"/>
-              </a:rPr>
-              <a:t>.</a:t>
+              <a:t>NJ.</a:t>
             </a:r>
           </a:p>
           <a:p>
@@ -11123,9 +11107,6 @@
               </a:rPr>
               <a:t>. 2011. Natural Language Processing (Almost) from Scratch. Journal of Machine Learning Research (JMLR).</a:t>
             </a:r>
-            <a:endParaRPr lang="en-US" sz="1500" dirty="0">
-              <a:hlinkClick r:id="rId2"/>
-            </a:endParaRPr>
           </a:p>
           <a:p>
             <a:r>
@@ -11591,11 +11572,7 @@
           <a:p>
             <a:r>
               <a:rPr lang="en-US" dirty="0" smtClean="0"/>
-              <a:t>Speaking/listening is </a:t>
-            </a:r>
-            <a:r>
-              <a:rPr lang="en-US" dirty="0" smtClean="0"/>
-              <a:t>safer, natural</a:t>
+              <a:t>Speaking/listening is safer, natural</a:t>
             </a:r>
             <a:endParaRPr lang="en-US" dirty="0"/>
           </a:p>
@@ -14088,11 +14065,7 @@
           <a:p>
             <a:r>
               <a:rPr lang="en-US" dirty="0" smtClean="0"/>
-              <a:t>Related </a:t>
-            </a:r>
-            <a:r>
-              <a:rPr lang="en-US" dirty="0" smtClean="0"/>
-              <a:t>work</a:t>
+              <a:t>Related work</a:t>
             </a:r>
             <a:endParaRPr lang="en-US" dirty="0"/>
           </a:p>
@@ -14221,11 +14194,7 @@
             <a:pPr lvl="1"/>
             <a:r>
               <a:rPr lang="en-US" sz="2000" dirty="0" smtClean="0"/>
-              <a:t>Combining </a:t>
-            </a:r>
-            <a:r>
-              <a:rPr lang="en-US" sz="2000" dirty="0" smtClean="0"/>
-              <a:t>different classifiers (</a:t>
+              <a:t>Combining different classifiers (</a:t>
             </a:r>
             <a:r>
               <a:rPr lang="en-US" sz="2000" dirty="0" err="1" smtClean="0"/>
@@ -14421,7 +14390,6 @@
               <a:rPr lang="en-US" dirty="0" smtClean="0"/>
               <a:t>Text Data</a:t>
             </a:r>
-            <a:endParaRPr lang="en-US" dirty="0" smtClean="0"/>
           </a:p>
           <a:p>
             <a:pPr lvl="1"/>
@@ -14444,7 +14412,6 @@
               <a:rPr lang="en-US" dirty="0" smtClean="0"/>
               <a:t>Task: what will you say when given a specific topic</a:t>
             </a:r>
-            <a:endParaRPr lang="en-US" dirty="0" smtClean="0"/>
           </a:p>
           <a:p>
             <a:endParaRPr lang="en-US" dirty="0" smtClean="0"/>

</xml_diff>